<commit_message>
Update Lecture 03 - Morphology.pptx
</commit_message>
<xml_diff>
--- a/ComputerVision/Lecture 03 - Morphology/Lecture 03 - Morphology.pptx
+++ b/ComputerVision/Lecture 03 - Morphology/Lecture 03 - Morphology.pptx
@@ -9484,11 +9484,11 @@
       </p:pic>
       <p:pic>
         <p:nvPicPr>
-          <p:cNvPr id="3" name="FineKeyBream-mobile">
+          <p:cNvPr id="4" name="Dilate">
             <a:hlinkClick r:id="" action="ppaction://media"/>
             <a:extLst>
               <a:ext uri="{FF2B5EF4-FFF2-40B4-BE49-F238E27FC236}">
-                <a16:creationId xmlns:a16="http://schemas.microsoft.com/office/drawing/2014/main" id="{ED117C60-6CA5-4F95-9458-6F5D92CD82C4}"/>
+                <a16:creationId xmlns:a16="http://schemas.microsoft.com/office/drawing/2014/main" id="{8AE099DD-390C-3C1F-4A96-8A56168C2A37}"/>
               </a:ext>
             </a:extLst>
           </p:cNvPr>
@@ -9512,8 +9512,8 @@
         </p:blipFill>
         <p:spPr>
           <a:xfrm>
-            <a:off x="5813424" y="3191996"/>
-            <a:ext cx="3590352" cy="2692764"/>
+            <a:off x="5594756" y="2791513"/>
+            <a:ext cx="4295524" cy="3221643"/>
           </a:xfrm>
           <a:prstGeom prst="rect">
             <a:avLst/>
@@ -9535,7 +9535,7 @@
       <p:par>
         <p:cTn id="1" dur="indefinite" restart="never" nodeType="tmRoot">
           <p:childTnLst>
-            <p:seq>
+            <p:seq concurrent="1" nextAc="seek">
               <p:cTn id="2" dur="indefinite" nodeType="mainSeq">
                 <p:childTnLst>
                   <p:par>
@@ -9558,9 +9558,9 @@
                                   <p:childTnLst>
                                     <p:cmd type="call" cmd="playFrom(0.0)">
                                       <p:cBhvr>
-                                        <p:cTn id="6" dur="29560" fill="hold"/>
+                                        <p:cTn id="6" dur="35560" fill="hold"/>
                                         <p:tgtEl>
-                                          <p:spTgt spid="3"/>
+                                          <p:spTgt spid="4"/>
                                         </p:tgtEl>
                                       </p:cBhvr>
                                     </p:cmd>
@@ -9598,7 +9598,7 @@
                   </p:stCondLst>
                 </p:cTn>
                 <p:tgtEl>
-                  <p:spTgt spid="3"/>
+                  <p:spTgt spid="4"/>
                 </p:tgtEl>
               </p:cMediaNode>
             </p:video>
@@ -9607,7 +9607,7 @@
                 <p:stCondLst>
                   <p:cond evt="onClick" delay="0">
                     <p:tgtEl>
-                      <p:spTgt spid="3"/>
+                      <p:spTgt spid="4"/>
                     </p:tgtEl>
                   </p:cond>
                 </p:stCondLst>
@@ -9637,7 +9637,7 @@
                                       <p:cBhvr>
                                         <p:cTn id="12" dur="1" fill="hold"/>
                                         <p:tgtEl>
-                                          <p:spTgt spid="3"/>
+                                          <p:spTgt spid="4"/>
                                         </p:tgtEl>
                                       </p:cBhvr>
                                     </p:cmd>
@@ -9655,7 +9655,7 @@
               <p:nextCondLst>
                 <p:cond evt="onClick" delay="0">
                   <p:tgtEl>
-                    <p:spTgt spid="3"/>
+                    <p:spTgt spid="4"/>
                   </p:tgtEl>
                 </p:cond>
               </p:nextCondLst>

</xml_diff>